<commit_message>
update doc for lab5 and lab6
</commit_message>
<xml_diff>
--- a/tutorials/lab6_FPGA原型验证.pptx
+++ b/tutorials/lab6_FPGA原型验证.pptx
@@ -9,7 +9,7 @@
   </p:notesMasterIdLst>
   <p:sldIdLst>
     <p:sldId id="2248" r:id="rId2"/>
-    <p:sldId id="7066" r:id="rId3"/>
+    <p:sldId id="7067" r:id="rId3"/>
     <p:sldId id="6814" r:id="rId4"/>
     <p:sldId id="6798" r:id="rId5"/>
     <p:sldId id="6799" r:id="rId6"/>
@@ -119,7 +119,7 @@
         <p14:section name="提纲" id="{61A3C44E-92D6-46EB-A1AC-09F30B6D5135}">
           <p14:sldIdLst>
             <p14:sldId id="2248"/>
-            <p14:sldId id="7066"/>
+            <p14:sldId id="7067"/>
             <p14:sldId id="6814"/>
             <p14:sldId id="6798"/>
             <p14:sldId id="6799"/>
@@ -7452,84 +7452,60 @@
           <a:lstStyle/>
           <a:p>
             <a:r>
-              <a:rPr lang="zh-CN" altLang="en-US" sz="1600" dirty="0"/>
+              <a:rPr lang="zh-CN" altLang="en-US" sz="1400" dirty="0"/>
+              <a:t>下载实验代码和教程</a:t>
+            </a:r>
+            <a:endParaRPr lang="en-US" altLang="zh-CN" sz="1400" dirty="0"/>
+          </a:p>
+          <a:p>
+            <a:pPr lvl="1"/>
+            <a:r>
+              <a:rPr lang="en-US" altLang="zh-CN" sz="1200" dirty="0"/>
+              <a:t>git clone </a:t>
+            </a:r>
+            <a:r>
+              <a:rPr lang="en-US" altLang="zh-CN" sz="1200" dirty="0">
+                <a:hlinkClick r:id="rId2"/>
+              </a:rPr>
+              <a:t>https://github.com/beforewind/asic_labs.git</a:t>
+            </a:r>
+            <a:r>
+              <a:rPr lang="en-US" altLang="zh-CN" sz="1200" dirty="0"/>
+              <a:t> </a:t>
+            </a:r>
+            <a:r>
+              <a:rPr lang="zh-CN" altLang="en-US" sz="1200" dirty="0"/>
+              <a:t>或 </a:t>
+            </a:r>
+            <a:r>
+              <a:rPr lang="en-US" altLang="zh-CN" sz="1200" dirty="0"/>
+              <a:t>git pull (</a:t>
+            </a:r>
+            <a:r>
+              <a:rPr lang="zh-CN" altLang="en-US" sz="1200" dirty="0"/>
+              <a:t>更新</a:t>
+            </a:r>
+            <a:r>
+              <a:rPr lang="en-US" altLang="zh-CN" sz="1200" dirty="0"/>
+              <a:t>)</a:t>
+            </a:r>
+          </a:p>
+          <a:p>
+            <a:r>
+              <a:rPr lang="zh-CN" altLang="en-US" sz="1400" dirty="0"/>
               <a:t>从</a:t>
             </a:r>
             <a:r>
-              <a:rPr lang="en-US" altLang="zh-CN" sz="1600" dirty="0"/>
+              <a:rPr lang="en-US" altLang="zh-CN" sz="1400" dirty="0"/>
               <a:t>lab2\</a:t>
             </a:r>
             <a:r>
-              <a:rPr lang="en-US" altLang="zh-CN" sz="1600" dirty="0" err="1"/>
+              <a:rPr lang="en-US" altLang="zh-CN" sz="1400" dirty="0" err="1"/>
               <a:t>vivado</a:t>
             </a:r>
             <a:r>
-              <a:rPr lang="en-US" altLang="zh-CN" sz="1600" dirty="0"/>
+              <a:rPr lang="en-US" altLang="zh-CN" sz="1400" dirty="0"/>
               <a:t>\</a:t>
-            </a:r>
-            <a:r>
-              <a:rPr lang="en-US" altLang="zh-CN" sz="1600" dirty="0" err="1"/>
-              <a:t>rvfpganexys.tcl</a:t>
-            </a:r>
-            <a:r>
-              <a:rPr lang="zh-CN" altLang="en-US" sz="1600" dirty="0"/>
-              <a:t>文件恢复</a:t>
-            </a:r>
-            <a:r>
-              <a:rPr lang="en-US" altLang="zh-CN" sz="1600" dirty="0" err="1"/>
-              <a:t>Vivado</a:t>
-            </a:r>
-            <a:r>
-              <a:rPr lang="zh-CN" altLang="en-US" sz="1600" dirty="0"/>
-              <a:t>工程</a:t>
-            </a:r>
-            <a:endParaRPr lang="en-US" altLang="zh-CN" sz="1600" dirty="0"/>
-          </a:p>
-          <a:p>
-            <a:r>
-              <a:rPr lang="zh-CN" altLang="en-US" sz="1600" dirty="0"/>
-              <a:t>打开</a:t>
-            </a:r>
-            <a:r>
-              <a:rPr lang="en-US" altLang="zh-CN" sz="1600" dirty="0" err="1"/>
-              <a:t>Vivado</a:t>
-            </a:r>
-            <a:r>
-              <a:rPr lang="zh-CN" altLang="en-US" sz="1600" dirty="0"/>
-              <a:t>界面</a:t>
-            </a:r>
-            <a:endParaRPr lang="en-US" altLang="zh-CN" sz="1600" dirty="0"/>
-          </a:p>
-          <a:p>
-            <a:r>
-              <a:rPr lang="en-US" altLang="zh-CN" sz="1600" dirty="0"/>
-              <a:t>Window -&gt; </a:t>
-            </a:r>
-            <a:r>
-              <a:rPr lang="en-US" altLang="zh-CN" sz="1600" dirty="0" err="1"/>
-              <a:t>Tcl</a:t>
-            </a:r>
-            <a:r>
-              <a:rPr lang="en-US" altLang="zh-CN" sz="1600" dirty="0"/>
-              <a:t> Console</a:t>
-            </a:r>
-          </a:p>
-          <a:p>
-            <a:r>
-              <a:rPr lang="en-US" altLang="zh-CN" sz="1600" dirty="0"/>
-              <a:t>cd lab2\</a:t>
-            </a:r>
-            <a:r>
-              <a:rPr lang="en-US" altLang="zh-CN" sz="1600" dirty="0" err="1"/>
-              <a:t>vivado</a:t>
-            </a:r>
-            <a:endParaRPr lang="en-US" altLang="zh-CN" sz="1600" dirty="0"/>
-          </a:p>
-          <a:p>
-            <a:pPr lvl="1"/>
-            <a:r>
-              <a:rPr lang="zh-CN" altLang="en-US" sz="1400" dirty="0"/>
-              <a:t>切换到</a:t>
             </a:r>
             <a:r>
               <a:rPr lang="en-US" altLang="zh-CN" sz="1400" dirty="0" err="1"/>
@@ -7537,212 +7513,397 @@
             </a:r>
             <a:r>
               <a:rPr lang="zh-CN" altLang="en-US" sz="1400" dirty="0"/>
-              <a:t>文件所在目录</a:t>
-            </a:r>
-          </a:p>
-          <a:p>
-            <a:r>
-              <a:rPr lang="en-US" altLang="zh-CN" sz="1600" dirty="0"/>
-              <a:t>source </a:t>
-            </a:r>
-            <a:r>
-              <a:rPr lang="en-US" altLang="zh-CN" sz="1600" dirty="0" err="1"/>
-              <a:t>rvfpganexys.tcl</a:t>
-            </a:r>
-            <a:endParaRPr lang="en-US" altLang="zh-CN" sz="1600" dirty="0"/>
-          </a:p>
-          <a:p>
-            <a:pPr lvl="1"/>
+              <a:t>文件恢复</a:t>
+            </a:r>
+            <a:r>
+              <a:rPr lang="en-US" altLang="zh-CN" sz="1400" dirty="0" err="1"/>
+              <a:t>Vivado</a:t>
+            </a:r>
             <a:r>
               <a:rPr lang="zh-CN" altLang="en-US" sz="1400" dirty="0"/>
-              <a:t>在</a:t>
-            </a:r>
+              <a:t>工程</a:t>
+            </a:r>
+            <a:endParaRPr lang="en-US" altLang="zh-CN" sz="1400" dirty="0"/>
+          </a:p>
+          <a:p>
+            <a:r>
+              <a:rPr lang="zh-CN" altLang="en-US" sz="1400" dirty="0"/>
+              <a:t>打开</a:t>
+            </a:r>
+            <a:r>
+              <a:rPr lang="en-US" altLang="zh-CN" sz="1400" dirty="0" err="1"/>
+              <a:t>Vivado</a:t>
+            </a:r>
+            <a:r>
+              <a:rPr lang="zh-CN" altLang="en-US" sz="1400" dirty="0"/>
+              <a:t>界面</a:t>
+            </a:r>
+            <a:endParaRPr lang="en-US" altLang="zh-CN" sz="1400" dirty="0"/>
+          </a:p>
+          <a:p>
             <a:r>
               <a:rPr lang="en-US" altLang="zh-CN" sz="1400" dirty="0"/>
-              <a:t>lab2\</a:t>
+              <a:t>Window -&gt; </a:t>
+            </a:r>
+            <a:r>
+              <a:rPr lang="en-US" altLang="zh-CN" sz="1400" dirty="0" err="1"/>
+              <a:t>Tcl</a:t>
+            </a:r>
+            <a:r>
+              <a:rPr lang="en-US" altLang="zh-CN" sz="1400" dirty="0"/>
+              <a:t> Console</a:t>
+            </a:r>
+          </a:p>
+          <a:p>
+            <a:r>
+              <a:rPr lang="en-US" altLang="zh-CN" sz="1400" dirty="0"/>
+              <a:t>cd lab2\</a:t>
             </a:r>
             <a:r>
               <a:rPr lang="en-US" altLang="zh-CN" sz="1400" dirty="0" err="1"/>
               <a:t>vivado</a:t>
             </a:r>
+            <a:endParaRPr lang="en-US" altLang="zh-CN" sz="1400" dirty="0"/>
+          </a:p>
+          <a:p>
+            <a:pPr lvl="1"/>
+            <a:r>
+              <a:rPr lang="zh-CN" altLang="en-US" sz="1200" dirty="0"/>
+              <a:t>切换到</a:t>
+            </a:r>
+            <a:r>
+              <a:rPr lang="en-US" altLang="zh-CN" sz="1200" dirty="0" err="1"/>
+              <a:t>rvfpganexys.tcl</a:t>
+            </a:r>
+            <a:r>
+              <a:rPr lang="zh-CN" altLang="en-US" sz="1200" dirty="0"/>
+              <a:t>文件所在目录</a:t>
+            </a:r>
+          </a:p>
+          <a:p>
+            <a:r>
+              <a:rPr lang="en-US" altLang="zh-CN" sz="1400" dirty="0"/>
+              <a:t>source </a:t>
+            </a:r>
+            <a:r>
+              <a:rPr lang="en-US" altLang="zh-CN" sz="1400" dirty="0" err="1"/>
+              <a:t>rvfpganexys.tcl</a:t>
+            </a:r>
+            <a:endParaRPr lang="en-US" altLang="zh-CN" sz="1400" dirty="0"/>
+          </a:p>
+          <a:p>
+            <a:pPr lvl="1"/>
+            <a:r>
+              <a:rPr lang="zh-CN" altLang="en-US" sz="1200" dirty="0"/>
+              <a:t>在</a:t>
+            </a:r>
+            <a:r>
+              <a:rPr lang="en-US" altLang="zh-CN" sz="1200" dirty="0"/>
+              <a:t>lab2\</a:t>
+            </a:r>
+            <a:r>
+              <a:rPr lang="en-US" altLang="zh-CN" sz="1200" dirty="0" err="1"/>
+              <a:t>vivado</a:t>
+            </a:r>
+            <a:r>
+              <a:rPr lang="zh-CN" altLang="en-US" sz="1200" dirty="0"/>
+              <a:t>目录下生成工程目录</a:t>
+            </a:r>
+            <a:r>
+              <a:rPr lang="en-US" altLang="zh-CN" sz="1200" dirty="0" err="1"/>
+              <a:t>rvfpganexys</a:t>
+            </a:r>
+            <a:r>
+              <a:rPr lang="zh-CN" altLang="en-US" sz="1200" dirty="0"/>
+              <a:t>及工程文件</a:t>
+            </a:r>
+            <a:r>
+              <a:rPr lang="en-US" altLang="zh-CN" sz="1200" dirty="0" err="1"/>
+              <a:t>rvfpganexys.xpr</a:t>
+            </a:r>
+            <a:endParaRPr lang="en-US" altLang="zh-CN" sz="1200" dirty="0"/>
+          </a:p>
+          <a:p>
             <a:r>
               <a:rPr lang="zh-CN" altLang="en-US" sz="1400" dirty="0"/>
-              <a:t>目录下生成工程目录</a:t>
+              <a:t>执行脚本，添加</a:t>
+            </a:r>
+            <a:r>
+              <a:rPr lang="en-US" altLang="zh-CN" sz="1400" dirty="0"/>
+              <a:t>include</a:t>
+            </a:r>
+            <a:r>
+              <a:rPr lang="zh-CN" altLang="en-US" sz="1400" dirty="0"/>
+              <a:t>路径（貌似</a:t>
+            </a:r>
+            <a:r>
+              <a:rPr lang="en-US" altLang="zh-CN" sz="1400" dirty="0"/>
+              <a:t>source </a:t>
             </a:r>
             <a:r>
               <a:rPr lang="en-US" altLang="zh-CN" sz="1400" dirty="0" err="1"/>
-              <a:t>rvfpganexys</a:t>
+              <a:t>rvfpganexys.tcl</a:t>
             </a:r>
             <a:r>
               <a:rPr lang="zh-CN" altLang="en-US" sz="1400" dirty="0"/>
-              <a:t>及工程文件</a:t>
-            </a:r>
-            <a:r>
-              <a:rPr lang="en-US" altLang="zh-CN" sz="1400" dirty="0" err="1"/>
-              <a:t>rvfpganexys.xpr</a:t>
+              <a:t>没有正确执行该行，所以重新执行以下）</a:t>
+            </a:r>
+          </a:p>
+          <a:p>
+            <a:pPr lvl="1"/>
+            <a:r>
+              <a:rPr lang="en-US" altLang="zh-CN" sz="1200" dirty="0" err="1"/>
+              <a:t>set_property</a:t>
+            </a:r>
+            <a:r>
+              <a:rPr lang="en-US" altLang="zh-CN" sz="1200" dirty="0"/>
+              <a:t> -name "</a:t>
+            </a:r>
+            <a:r>
+              <a:rPr lang="en-US" altLang="zh-CN" sz="1200" dirty="0" err="1"/>
+              <a:t>include_dirs</a:t>
+            </a:r>
+            <a:r>
+              <a:rPr lang="en-US" altLang="zh-CN" sz="1200" dirty="0"/>
+              <a:t>" -value "[file normalize "$</a:t>
+            </a:r>
+            <a:r>
+              <a:rPr lang="en-US" altLang="zh-CN" sz="1200" dirty="0" err="1"/>
+              <a:t>origin_dir</a:t>
+            </a:r>
+            <a:r>
+              <a:rPr lang="en-US" altLang="zh-CN" sz="1200" dirty="0"/>
+              <a:t>/../</a:t>
+            </a:r>
+            <a:r>
+              <a:rPr lang="en-US" altLang="zh-CN" sz="1200" dirty="0" err="1"/>
+              <a:t>src</a:t>
+            </a:r>
+            <a:r>
+              <a:rPr lang="en-US" altLang="zh-CN" sz="1200" dirty="0"/>
+              <a:t>/</a:t>
+            </a:r>
+            <a:r>
+              <a:rPr lang="en-US" altLang="zh-CN" sz="1200" dirty="0" err="1"/>
+              <a:t>VeeRwolf</a:t>
+            </a:r>
+            <a:r>
+              <a:rPr lang="en-US" altLang="zh-CN" sz="1200" dirty="0"/>
+              <a:t>/Interconnect/</a:t>
+            </a:r>
+            <a:r>
+              <a:rPr lang="en-US" altLang="zh-CN" sz="1200" dirty="0" err="1"/>
+              <a:t>AxiInterconnect</a:t>
+            </a:r>
+            <a:r>
+              <a:rPr lang="en-US" altLang="zh-CN" sz="1200" dirty="0"/>
+              <a:t>/pulp-platform.org__axi_0.25.0/include"] [file normalize "$</a:t>
+            </a:r>
+            <a:r>
+              <a:rPr lang="en-US" altLang="zh-CN" sz="1200" dirty="0" err="1"/>
+              <a:t>origin_dir</a:t>
+            </a:r>
+            <a:r>
+              <a:rPr lang="en-US" altLang="zh-CN" sz="1200" dirty="0"/>
+              <a:t>/../</a:t>
+            </a:r>
+            <a:r>
+              <a:rPr lang="en-US" altLang="zh-CN" sz="1200" dirty="0" err="1"/>
+              <a:t>src</a:t>
+            </a:r>
+            <a:r>
+              <a:rPr lang="en-US" altLang="zh-CN" sz="1200" dirty="0"/>
+              <a:t>/</a:t>
+            </a:r>
+            <a:r>
+              <a:rPr lang="en-US" altLang="zh-CN" sz="1200" dirty="0" err="1"/>
+              <a:t>VeeRwolf</a:t>
+            </a:r>
+            <a:r>
+              <a:rPr lang="en-US" altLang="zh-CN" sz="1200" dirty="0"/>
+              <a:t>/VeeR_EL2CoreComplex/include"] [file normalize "$</a:t>
+            </a:r>
+            <a:r>
+              <a:rPr lang="en-US" altLang="zh-CN" sz="1200" dirty="0" err="1"/>
+              <a:t>origin_dir</a:t>
+            </a:r>
+            <a:r>
+              <a:rPr lang="en-US" altLang="zh-CN" sz="1200" dirty="0"/>
+              <a:t>/../</a:t>
+            </a:r>
+            <a:r>
+              <a:rPr lang="en-US" altLang="zh-CN" sz="1200" dirty="0" err="1"/>
+              <a:t>src</a:t>
+            </a:r>
+            <a:r>
+              <a:rPr lang="en-US" altLang="zh-CN" sz="1200" dirty="0"/>
+              <a:t>/</a:t>
+            </a:r>
+            <a:r>
+              <a:rPr lang="en-US" altLang="zh-CN" sz="1200" dirty="0" err="1"/>
+              <a:t>OtherSources</a:t>
+            </a:r>
+            <a:r>
+              <a:rPr lang="en-US" altLang="zh-CN" sz="1200" dirty="0"/>
+              <a:t>/pulp-platform.org__common_cells_1.20.0/include"]" -objects $obj</a:t>
+            </a:r>
+          </a:p>
+          <a:p>
+            <a:r>
+              <a:rPr lang="zh-CN" altLang="en-US" sz="1400" dirty="0"/>
+              <a:t>点击左侧导航栏的</a:t>
+            </a:r>
+            <a:r>
+              <a:rPr lang="en-US" altLang="zh-CN" sz="1400" dirty="0"/>
+              <a:t>Generate Bitstream</a:t>
+            </a:r>
+            <a:r>
+              <a:rPr lang="zh-CN" altLang="en-US" sz="1400" dirty="0"/>
+              <a:t>，生成位流</a:t>
             </a:r>
             <a:endParaRPr lang="en-US" altLang="zh-CN" sz="1400" dirty="0"/>
           </a:p>
           <a:p>
             <a:r>
-              <a:rPr lang="zh-CN" altLang="en-US" sz="1600" dirty="0"/>
-              <a:t>执行脚本，添加</a:t>
-            </a:r>
-            <a:r>
-              <a:rPr lang="en-US" altLang="zh-CN" sz="1600" dirty="0"/>
-              <a:t>include</a:t>
-            </a:r>
-            <a:r>
-              <a:rPr lang="zh-CN" altLang="en-US" sz="1600" dirty="0"/>
-              <a:t>路径（</a:t>
-            </a:r>
-            <a:r>
-              <a:rPr lang="en-US" altLang="zh-CN" sz="1600" dirty="0"/>
-              <a:t>source </a:t>
-            </a:r>
-            <a:r>
-              <a:rPr lang="en-US" altLang="zh-CN" sz="1600" dirty="0" err="1"/>
-              <a:t>rvfpganexys.tcl</a:t>
-            </a:r>
-            <a:r>
-              <a:rPr lang="zh-CN" altLang="en-US" sz="1600" dirty="0"/>
-              <a:t>没有正确执行）</a:t>
-            </a:r>
+              <a:rPr lang="zh-CN" altLang="en-US" sz="1400" dirty="0"/>
+              <a:t>查看</a:t>
+            </a:r>
+            <a:r>
+              <a:rPr lang="en-US" altLang="zh-CN" sz="1400" dirty="0"/>
+              <a:t>Synthesis</a:t>
+            </a:r>
+            <a:r>
+              <a:rPr lang="zh-CN" altLang="en-US" sz="1400" dirty="0"/>
+              <a:t>和</a:t>
+            </a:r>
+            <a:r>
+              <a:rPr lang="en-US" altLang="zh-CN" sz="1400" dirty="0"/>
+              <a:t>Implementation</a:t>
+            </a:r>
+            <a:r>
+              <a:rPr lang="zh-CN" altLang="en-US" sz="1400" dirty="0"/>
+              <a:t>阶段的报告</a:t>
+            </a:r>
+          </a:p>
+          <a:p>
+            <a:endParaRPr lang="en-US" altLang="zh-CN" sz="1400" dirty="0"/>
+          </a:p>
+          <a:p>
+            <a:r>
+              <a:rPr lang="zh-CN" altLang="en-US" sz="1400" dirty="0"/>
+              <a:t>有板子的情况下</a:t>
+            </a:r>
+            <a:endParaRPr lang="en-US" altLang="zh-CN" sz="1400" dirty="0"/>
           </a:p>
           <a:p>
             <a:pPr lvl="1"/>
             <a:r>
-              <a:rPr lang="en-US" altLang="zh-CN" sz="1400" dirty="0" err="1"/>
-              <a:t>set_property</a:t>
-            </a:r>
-            <a:r>
-              <a:rPr lang="en-US" altLang="zh-CN" sz="1400" dirty="0"/>
-              <a:t> -name "</a:t>
-            </a:r>
-            <a:r>
-              <a:rPr lang="en-US" altLang="zh-CN" sz="1400" dirty="0" err="1"/>
-              <a:t>include_dirs</a:t>
-            </a:r>
-            <a:r>
-              <a:rPr lang="en-US" altLang="zh-CN" sz="1400" dirty="0"/>
-              <a:t>" -value "[file normalize "$</a:t>
-            </a:r>
-            <a:r>
-              <a:rPr lang="en-US" altLang="zh-CN" sz="1400" dirty="0" err="1"/>
-              <a:t>origin_dir</a:t>
-            </a:r>
-            <a:r>
-              <a:rPr lang="en-US" altLang="zh-CN" sz="1400" dirty="0"/>
-              <a:t>/../</a:t>
-            </a:r>
-            <a:r>
-              <a:rPr lang="en-US" altLang="zh-CN" sz="1400" dirty="0" err="1"/>
-              <a:t>src</a:t>
-            </a:r>
-            <a:r>
-              <a:rPr lang="en-US" altLang="zh-CN" sz="1400" dirty="0"/>
-              <a:t>/</a:t>
-            </a:r>
-            <a:r>
-              <a:rPr lang="en-US" altLang="zh-CN" sz="1400" dirty="0" err="1"/>
-              <a:t>VeeRwolf</a:t>
-            </a:r>
-            <a:r>
-              <a:rPr lang="en-US" altLang="zh-CN" sz="1400" dirty="0"/>
-              <a:t>/Interconnect/</a:t>
-            </a:r>
-            <a:r>
-              <a:rPr lang="en-US" altLang="zh-CN" sz="1400" dirty="0" err="1"/>
-              <a:t>AxiInterconnect</a:t>
-            </a:r>
-            <a:r>
-              <a:rPr lang="en-US" altLang="zh-CN" sz="1400" dirty="0"/>
-              <a:t>/pulp-platform.org__axi_0.25.0/include"] [file normalize "$</a:t>
-            </a:r>
-            <a:r>
-              <a:rPr lang="en-US" altLang="zh-CN" sz="1400" dirty="0" err="1"/>
-              <a:t>origin_dir</a:t>
-            </a:r>
-            <a:r>
-              <a:rPr lang="en-US" altLang="zh-CN" sz="1400" dirty="0"/>
-              <a:t>/../</a:t>
-            </a:r>
-            <a:r>
-              <a:rPr lang="en-US" altLang="zh-CN" sz="1400" dirty="0" err="1"/>
-              <a:t>src</a:t>
-            </a:r>
-            <a:r>
-              <a:rPr lang="en-US" altLang="zh-CN" sz="1400" dirty="0"/>
-              <a:t>/</a:t>
-            </a:r>
-            <a:r>
-              <a:rPr lang="en-US" altLang="zh-CN" sz="1400" dirty="0" err="1"/>
-              <a:t>VeeRwolf</a:t>
-            </a:r>
-            <a:r>
-              <a:rPr lang="en-US" altLang="zh-CN" sz="1400" dirty="0"/>
-              <a:t>/VeeR_EL2CoreComplex/include"] [file normalize "$</a:t>
-            </a:r>
-            <a:r>
-              <a:rPr lang="en-US" altLang="zh-CN" sz="1400" dirty="0" err="1"/>
-              <a:t>origin_dir</a:t>
-            </a:r>
-            <a:r>
-              <a:rPr lang="en-US" altLang="zh-CN" sz="1400" dirty="0"/>
-              <a:t>/../</a:t>
-            </a:r>
-            <a:r>
-              <a:rPr lang="en-US" altLang="zh-CN" sz="1400" dirty="0" err="1"/>
-              <a:t>src</a:t>
-            </a:r>
-            <a:r>
-              <a:rPr lang="en-US" altLang="zh-CN" sz="1400" dirty="0"/>
-              <a:t>/</a:t>
-            </a:r>
-            <a:r>
-              <a:rPr lang="en-US" altLang="zh-CN" sz="1400" dirty="0" err="1"/>
-              <a:t>OtherSources</a:t>
-            </a:r>
-            <a:r>
-              <a:rPr lang="en-US" altLang="zh-CN" sz="1400" dirty="0"/>
-              <a:t>/pulp-platform.org__common_cells_1.20.0/include"]" -objects $obj</a:t>
-            </a:r>
-          </a:p>
-          <a:p>
-            <a:r>
-              <a:rPr lang="en-US" altLang="zh-CN" sz="1600" dirty="0"/>
-              <a:t>Generate Bitstream</a:t>
-            </a:r>
-            <a:r>
-              <a:rPr lang="zh-CN" altLang="en-US" sz="1600" dirty="0"/>
-              <a:t>生成位流</a:t>
-            </a:r>
-            <a:endParaRPr lang="en-US" altLang="zh-CN" sz="1600" dirty="0"/>
-          </a:p>
-          <a:p>
-            <a:r>
-              <a:rPr lang="zh-CN" altLang="en-US" sz="1600" dirty="0"/>
-              <a:t>查看</a:t>
-            </a:r>
-            <a:r>
-              <a:rPr lang="en-US" altLang="zh-CN" sz="1600" dirty="0"/>
-              <a:t>Synthesis</a:t>
-            </a:r>
-            <a:r>
-              <a:rPr lang="zh-CN" altLang="en-US" sz="1600" dirty="0"/>
-              <a:t>和</a:t>
-            </a:r>
-            <a:r>
-              <a:rPr lang="en-US" altLang="zh-CN" sz="1600" dirty="0"/>
-              <a:t>Implementation</a:t>
-            </a:r>
-            <a:r>
-              <a:rPr lang="zh-CN" altLang="en-US" sz="1600" dirty="0"/>
-              <a:t>阶段的报告</a:t>
-            </a:r>
-          </a:p>
-          <a:p>
-            <a:endParaRPr lang="zh-CN" altLang="en-US" dirty="0"/>
+              <a:rPr lang="zh-CN" altLang="en-US" sz="1200" dirty="0"/>
+              <a:t>在</a:t>
+            </a:r>
+            <a:r>
+              <a:rPr lang="en-US" altLang="zh-CN" sz="1200" dirty="0"/>
+              <a:t>asic_2204</a:t>
+            </a:r>
+            <a:r>
+              <a:rPr lang="zh-CN" altLang="en-US" sz="1200" dirty="0"/>
+              <a:t>虚拟机中，打开</a:t>
+            </a:r>
+            <a:r>
+              <a:rPr lang="en-US" altLang="zh-CN" sz="1200" dirty="0"/>
+              <a:t>Catapult Studio</a:t>
+            </a:r>
+            <a:r>
+              <a:rPr lang="zh-CN" altLang="en-US" sz="1200" dirty="0"/>
+              <a:t>，打开一个工程目录</a:t>
+            </a:r>
+            <a:r>
+              <a:rPr lang="en-US" altLang="zh-CN" sz="1200" dirty="0"/>
+              <a:t>lab2\examples\</a:t>
+            </a:r>
+            <a:r>
+              <a:rPr lang="en-US" altLang="zh-CN" sz="1200" dirty="0" err="1"/>
+              <a:t>HelloWorld_C</a:t>
+            </a:r>
+            <a:r>
+              <a:rPr lang="en-US" altLang="zh-CN" sz="1200" dirty="0"/>
+              <a:t>-Lang</a:t>
+            </a:r>
+          </a:p>
+          <a:p>
+            <a:pPr lvl="1"/>
+            <a:r>
+              <a:rPr lang="zh-CN" altLang="en-US" sz="1200" dirty="0"/>
+              <a:t>下载</a:t>
+            </a:r>
+            <a:r>
+              <a:rPr lang="en-US" altLang="zh-CN" sz="1200" dirty="0" err="1"/>
+              <a:t>vivado</a:t>
+            </a:r>
+            <a:r>
+              <a:rPr lang="zh-CN" altLang="en-US" sz="1200" dirty="0"/>
+              <a:t>工程生成的</a:t>
+            </a:r>
+            <a:r>
+              <a:rPr lang="en-US" altLang="zh-CN" sz="1200" dirty="0"/>
+              <a:t>FPGA</a:t>
+            </a:r>
+            <a:r>
+              <a:rPr lang="zh-CN" altLang="en-US" sz="1200" dirty="0"/>
+              <a:t>位流文件</a:t>
+            </a:r>
+            <a:r>
+              <a:rPr lang="en-US" altLang="zh-CN" sz="1200" dirty="0" err="1"/>
+              <a:t>rvfpganexys.bit</a:t>
+            </a:r>
+            <a:endParaRPr lang="en-US" altLang="zh-CN" sz="1200" dirty="0"/>
+          </a:p>
+          <a:p>
+            <a:pPr lvl="1"/>
+            <a:r>
+              <a:rPr lang="zh-CN" altLang="en-US" sz="1200" dirty="0"/>
+              <a:t>设置串口参数：</a:t>
+            </a:r>
+            <a:r>
+              <a:rPr lang="en-US" altLang="zh-CN" sz="1200" dirty="0"/>
+              <a:t>/dev/ttyUSB1, 115200</a:t>
+            </a:r>
+            <a:r>
+              <a:rPr lang="zh-CN" altLang="en-US" sz="1200" dirty="0"/>
+              <a:t>，</a:t>
+            </a:r>
+            <a:r>
+              <a:rPr lang="en-US" altLang="zh-CN" sz="1200" dirty="0"/>
+              <a:t>8</a:t>
+            </a:r>
+            <a:r>
+              <a:rPr lang="zh-CN" altLang="en-US" sz="1200" dirty="0"/>
+              <a:t>数据位，</a:t>
+            </a:r>
+            <a:r>
+              <a:rPr lang="en-US" altLang="zh-CN" sz="1200" dirty="0"/>
+              <a:t>1</a:t>
+            </a:r>
+            <a:r>
+              <a:rPr lang="zh-CN" altLang="en-US" sz="1200" dirty="0"/>
+              <a:t>停止位</a:t>
+            </a:r>
+            <a:endParaRPr lang="en-US" altLang="zh-CN" sz="1200" dirty="0"/>
+          </a:p>
+          <a:p>
+            <a:pPr lvl="1"/>
+            <a:r>
+              <a:rPr lang="en-US" altLang="zh-CN" sz="1200" dirty="0"/>
+              <a:t>Debug</a:t>
+            </a:r>
+          </a:p>
+          <a:p>
+            <a:pPr lvl="1"/>
+            <a:r>
+              <a:rPr lang="zh-CN" altLang="en-US" sz="1200" dirty="0"/>
+              <a:t>串口查看程序输出</a:t>
+            </a:r>
+            <a:endParaRPr lang="zh-CN" altLang="en-US" sz="1400" dirty="0"/>
           </a:p>
         </p:txBody>
       </p:sp>
@@ -7778,7 +7939,7 @@
     </p:spTree>
     <p:extLst>
       <p:ext uri="{BB962C8B-B14F-4D97-AF65-F5344CB8AC3E}">
-        <p14:creationId xmlns:p14="http://schemas.microsoft.com/office/powerpoint/2010/main" val="3931258591"/>
+        <p14:creationId xmlns:p14="http://schemas.microsoft.com/office/powerpoint/2010/main" val="2636493990"/>
       </p:ext>
     </p:extLst>
   </p:cSld>

</xml_diff>